<commit_message>
Interim Report - Submission
Interim Report - Submission
</commit_message>
<xml_diff>
--- a/Interim Report/PrototypeGuide/10524150_DBSFinalProject_PrototypeUserGuide cf v1-1 130820.pptx
+++ b/Interim Report/PrototypeGuide/10524150_DBSFinalProject_PrototypeUserGuide cf v1-1 130820.pptx
@@ -16651,21 +16651,21 @@
 </file>
 
 <file path=customXml/item2.xml><?xml version="1.0" encoding="utf-8"?>
+<?mso-contentType ?>
+<FormTemplates xmlns="http://schemas.microsoft.com/sharepoint/v3/contenttype/forms">
+  <Display>DocumentLibraryForm</Display>
+  <Edit>DocumentLibraryForm</Edit>
+  <New>DocumentLibraryForm</New>
+</FormTemplates>
+</file>
+
+<file path=customXml/item3.xml><?xml version="1.0" encoding="utf-8"?>
 <p:properties xmlns:p="http://schemas.microsoft.com/office/2006/metadata/properties" xmlns:xsi="http://www.w3.org/2001/XMLSchema-instance" xmlns:pc="http://schemas.microsoft.com/office/infopath/2007/PartnerControls">
   <documentManagement>
     <_ip_UnifiedCompliancePolicyUIAction xmlns="http://schemas.microsoft.com/sharepoint/v3" xsi:nil="true"/>
     <_ip_UnifiedCompliancePolicyProperties xmlns="http://schemas.microsoft.com/sharepoint/v3" xsi:nil="true"/>
   </documentManagement>
 </p:properties>
-</file>
-
-<file path=customXml/item3.xml><?xml version="1.0" encoding="utf-8"?>
-<?mso-contentType ?>
-<FormTemplates xmlns="http://schemas.microsoft.com/sharepoint/v3/contenttype/forms">
-  <Display>DocumentLibraryForm</Display>
-  <Edit>DocumentLibraryForm</Edit>
-  <New>DocumentLibraryForm</New>
-</FormTemplates>
 </file>
 
 <file path=customXml/itemProps1.xml><?xml version="1.0" encoding="utf-8"?>
@@ -16689,6 +16689,14 @@
 </file>
 
 <file path=customXml/itemProps2.xml><?xml version="1.0" encoding="utf-8"?>
+<ds:datastoreItem xmlns:ds="http://schemas.openxmlformats.org/officeDocument/2006/customXml" ds:itemID="{30ECC70E-6674-4337-B48B-AF4F8832F1E5}">
+  <ds:schemaRefs>
+    <ds:schemaRef ds:uri="http://schemas.microsoft.com/sharepoint/v3/contenttype/forms"/>
+  </ds:schemaRefs>
+</ds:datastoreItem>
+</file>
+
+<file path=customXml/itemProps3.xml><?xml version="1.0" encoding="utf-8"?>
 <ds:datastoreItem xmlns:ds="http://schemas.openxmlformats.org/officeDocument/2006/customXml" ds:itemID="{816B76F2-1AE1-4A2A-A5B3-D462CC5E81F8}">
   <ds:schemaRefs>
     <ds:schemaRef ds:uri="http://purl.org/dc/elements/1.1/"/>
@@ -16704,12 +16712,4 @@
     <ds:schemaRef ds:uri="http://purl.org/dc/terms/"/>
   </ds:schemaRefs>
 </ds:datastoreItem>
-</file>
-
-<file path=customXml/itemProps3.xml><?xml version="1.0" encoding="utf-8"?>
-<ds:datastoreItem xmlns:ds="http://schemas.openxmlformats.org/officeDocument/2006/customXml" ds:itemID="{30ECC70E-6674-4337-B48B-AF4F8832F1E5}">
-  <ds:schemaRefs>
-    <ds:schemaRef ds:uri="http://schemas.microsoft.com/sharepoint/v3/contenttype/forms"/>
-  </ds:schemaRefs>
-</ds:datastoreItem>
 </file>
</xml_diff>